<commit_message>
update results + presentation
</commit_message>
<xml_diff>
--- a/presentation.pptx
+++ b/presentation.pptx
@@ -4123,10 +4123,10 @@
       </p:sp>
       <p:pic>
         <p:nvPicPr>
-          <p:cNvPr id="6" name="Content Placeholder 5" descr="A graph with blue lines&#10;&#10;Description automatically generated">
+          <p:cNvPr id="8" name="Content Placeholder 7" descr="A graph of a graph of a test&#10;&#10;Description automatically generated with medium confidence">
             <a:extLst>
               <a:ext uri="{FF2B5EF4-FFF2-40B4-BE49-F238E27FC236}">
-                <a16:creationId xmlns:a16="http://schemas.microsoft.com/office/drawing/2014/main" id="{48D25C94-5A27-1468-D137-2610C211AD21}"/>
+                <a16:creationId xmlns:a16="http://schemas.microsoft.com/office/drawing/2014/main" id="{CFF78309-9E15-9AD3-F5C2-C9FAC49C791A}"/>
               </a:ext>
             </a:extLst>
           </p:cNvPr>
@@ -4138,46 +4138,22 @@
           </p:nvPr>
         </p:nvPicPr>
         <p:blipFill>
-          <a:blip r:embed="rId2"/>
+          <a:blip r:embed="rId2">
+            <a:extLst>
+              <a:ext uri="{28A0092B-C50C-407E-A947-70E740481C1C}">
+                <a14:useLocalDpi xmlns:a14="http://schemas.microsoft.com/office/drawing/2010/main" val="0"/>
+              </a:ext>
+            </a:extLst>
+          </a:blip>
           <a:stretch>
             <a:fillRect/>
           </a:stretch>
         </p:blipFill>
         <p:spPr>
           <a:xfrm>
-            <a:off x="1250114" y="1989896"/>
-            <a:ext cx="3594947" cy="4023360"/>
+            <a:off x="2527108" y="1846263"/>
+            <a:ext cx="7198109" cy="4022725"/>
           </a:xfrm>
-        </p:spPr>
-      </p:pic>
-      <p:pic>
-        <p:nvPicPr>
-          <p:cNvPr id="7" name="Picture 6" descr="A graph with blue lines&#10;&#10;Description automatically generated">
-            <a:extLst>
-              <a:ext uri="{FF2B5EF4-FFF2-40B4-BE49-F238E27FC236}">
-                <a16:creationId xmlns:a16="http://schemas.microsoft.com/office/drawing/2014/main" id="{DA0C713E-21EA-8887-6FA3-5307F5CF4059}"/>
-              </a:ext>
-            </a:extLst>
-          </p:cNvPr>
-          <p:cNvPicPr>
-            <a:picLocks noChangeAspect="1"/>
-          </p:cNvPicPr>
-          <p:nvPr/>
-        </p:nvPicPr>
-        <p:blipFill>
-          <a:blip r:embed="rId3"/>
-          <a:stretch>
-            <a:fillRect/>
-          </a:stretch>
-        </p:blipFill>
-        <p:spPr>
-          <a:xfrm>
-            <a:off x="5171868" y="1989438"/>
-            <a:ext cx="3712075" cy="4114800"/>
-          </a:xfrm>
-          <a:prstGeom prst="rect">
-            <a:avLst/>
-          </a:prstGeom>
         </p:spPr>
       </p:pic>
     </p:spTree>
@@ -4578,10 +4554,10 @@
           </a:p>
           <a:p>
             <a:r>
-              <a:rPr lang="en-US"/>
+              <a:rPr lang="en-US" dirty="0"/>
               <a:t>On Hockey Fights Dataset:</a:t>
             </a:r>
-            <a:endParaRPr lang="en-US">
+            <a:endParaRPr lang="en-US" dirty="0">
               <a:solidFill>
                 <a:srgbClr val="000000"/>
               </a:solidFill>
@@ -4594,7 +4570,7 @@
             </a:pPr>
             <a:r>
               <a:rPr lang="en-US" dirty="0"/>
-              <a:t>Test Accuracy: 55%</a:t>
+              <a:t>Test Accuracy: 86%</a:t>
             </a:r>
           </a:p>
           <a:p>
@@ -4627,7 +4603,7 @@
         </p:spPr>
         <p:txBody>
           <a:bodyPr vert="horz" lIns="0" tIns="45720" rIns="0" bIns="45720" rtlCol="0" anchor="t">
-            <a:normAutofit/>
+            <a:normAutofit fontScale="92500" lnSpcReduction="20000"/>
           </a:bodyPr>
           <a:lstStyle>
             <a:lvl1pPr marL="0" indent="0" algn="l" defTabSz="914400" rtl="0" eaLnBrk="1" latinLnBrk="0" hangingPunct="1">
@@ -4896,7 +4872,30 @@
               <a:buFont typeface="Arial" panose="020F0502020204030204" pitchFamily="34" charset="0"/>
               <a:buChar char="•"/>
             </a:pPr>
-            <a:endParaRPr lang="en-US" dirty="0"/>
+            <a:r>
+              <a:rPr lang="en-US" dirty="0"/>
+              <a:t>No validation (dev) set</a:t>
+            </a:r>
+          </a:p>
+          <a:p>
+            <a:pPr marL="342900" indent="-342900">
+              <a:buFont typeface="Arial" panose="020F0502020204030204" pitchFamily="34" charset="0"/>
+              <a:buChar char="•"/>
+            </a:pPr>
+            <a:r>
+              <a:rPr lang="en-US" dirty="0"/>
+              <a:t>Not using k-fold cross validation </a:t>
+            </a:r>
+          </a:p>
+          <a:p>
+            <a:pPr marL="342900" indent="-342900">
+              <a:buFont typeface="Arial" panose="020F0502020204030204" pitchFamily="34" charset="0"/>
+              <a:buChar char="•"/>
+            </a:pPr>
+            <a:r>
+              <a:rPr lang="en-US" dirty="0"/>
+              <a:t>Not employing an attention mechanism</a:t>
+            </a:r>
           </a:p>
           <a:p>
             <a:endParaRPr lang="en-US" dirty="0"/>
@@ -5038,7 +5037,7 @@
         </p:blipFill>
         <p:spPr>
           <a:xfrm>
-            <a:off x="3960471" y="3647340"/>
+            <a:off x="4678226" y="3529353"/>
             <a:ext cx="4014486" cy="3210660"/>
           </a:xfrm>
           <a:prstGeom prst="rect">
@@ -5859,7 +5858,7 @@
             </a:pPr>
             <a:r>
               <a:rPr lang="en-US" sz="2400" b="1" dirty="0"/>
-              <a:t>Implement an architecture inspired by </a:t>
+              <a:t>Implemented an architecture inspired by </a:t>
             </a:r>
             <a:r>
               <a:rPr lang="en-US" sz="2400" b="1" dirty="0" err="1"/>
@@ -5877,7 +5876,7 @@
             </a:pPr>
             <a:r>
               <a:rPr lang="en-US" sz="2400" b="1" dirty="0"/>
-              <a:t>Implement a </a:t>
+              <a:t>Implemented a </a:t>
             </a:r>
             <a:r>
               <a:rPr lang="en-US" sz="2400" b="1" dirty="0" err="1"/>
@@ -5896,7 +5895,7 @@
             </a:pPr>
             <a:r>
               <a:rPr lang="en-US" sz="2400" b="1" dirty="0"/>
-              <a:t>Adapt the </a:t>
+              <a:t>Adapted the </a:t>
             </a:r>
             <a:r>
               <a:rPr lang="en-US" sz="2400" b="1" dirty="0" err="1"/>
@@ -5914,7 +5913,7 @@
             </a:pPr>
             <a:r>
               <a:rPr lang="en-US" sz="2400" b="1" dirty="0"/>
-              <a:t>Preprocess videos to obtain the Optical Flow Field ad use that to improve the model’s perception of the video clip</a:t>
+              <a:t>Preprocessed videos to obtain the Optical Flow Field and used that to improve the model’s perception of the video clip</a:t>
             </a:r>
           </a:p>
           <a:p>
@@ -6354,7 +6353,7 @@
                 <a:ea typeface="+mn-lt"/>
                 <a:cs typeface="+mn-lt"/>
               </a:rPr>
-              <a:t>Accuracy: 82%</a:t>
+              <a:t>Accuracy: 86%</a:t>
             </a:r>
             <a:endParaRPr lang="en-US" b="1" dirty="0">
               <a:ea typeface="+mn-lt"/>
@@ -6388,7 +6387,7 @@
                 <a:ea typeface="+mn-lt"/>
                 <a:cs typeface="+mn-lt"/>
               </a:rPr>
-              <a:t>Weighted recall: 82%</a:t>
+              <a:t>Weighted recall: 86%</a:t>
             </a:r>
             <a:endParaRPr lang="en-US" b="1" dirty="0">
               <a:ea typeface="+mn-lt"/>
@@ -6405,7 +6404,7 @@
                 <a:ea typeface="+mn-lt"/>
                 <a:cs typeface="+mn-lt"/>
               </a:rPr>
-              <a:t>Weighted F-score: 82%.</a:t>
+              <a:t>Weighted F-score: 86%</a:t>
             </a:r>
             <a:endParaRPr lang="en-US" b="1" dirty="0"/>
           </a:p>
@@ -6414,6 +6413,42 @@
           </a:p>
         </p:txBody>
       </p:sp>
+      <p:pic>
+        <p:nvPicPr>
+          <p:cNvPr id="5" name="Picture 4" descr="A blue squares with white text&#10;&#10;Description automatically generated">
+            <a:extLst>
+              <a:ext uri="{FF2B5EF4-FFF2-40B4-BE49-F238E27FC236}">
+                <a16:creationId xmlns:a16="http://schemas.microsoft.com/office/drawing/2014/main" id="{D71657C5-BA4D-C9E4-F1D5-7D0E543C710B}"/>
+              </a:ext>
+            </a:extLst>
+          </p:cNvPr>
+          <p:cNvPicPr>
+            <a:picLocks noChangeAspect="1"/>
+          </p:cNvPicPr>
+          <p:nvPr/>
+        </p:nvPicPr>
+        <p:blipFill>
+          <a:blip r:embed="rId2">
+            <a:extLst>
+              <a:ext uri="{28A0092B-C50C-407E-A947-70E740481C1C}">
+                <a14:useLocalDpi xmlns:a14="http://schemas.microsoft.com/office/drawing/2010/main" val="0"/>
+              </a:ext>
+            </a:extLst>
+          </a:blip>
+          <a:stretch>
+            <a:fillRect/>
+          </a:stretch>
+        </p:blipFill>
+        <p:spPr>
+          <a:xfrm>
+            <a:off x="5283506" y="1845734"/>
+            <a:ext cx="4928626" cy="3776479"/>
+          </a:xfrm>
+          <a:prstGeom prst="rect">
+            <a:avLst/>
+          </a:prstGeom>
+        </p:spPr>
+      </p:pic>
     </p:spTree>
     <p:extLst>
       <p:ext uri="{BB962C8B-B14F-4D97-AF65-F5344CB8AC3E}">

</xml_diff>